<commit_message>
SW reu 11 aout
</commit_message>
<xml_diff>
--- a/GestionDeProjet/Reunions/Reunion_11_08_2022/Reunion_avancement_11_08_22.pptx
+++ b/GestionDeProjet/Reunions/Reunion_11_08_2022/Reunion_avancement_11_08_22.pptx
@@ -8044,6 +8044,62 @@
           </a:p>
         </p:txBody>
       </p:sp>
+      <p:sp>
+        <p:nvSpPr>
+          <p:cNvPr id="3" name="ZoneTexte 2">
+            <a:extLst>
+              <a:ext uri="{FF2B5EF4-FFF2-40B4-BE49-F238E27FC236}">
+                <a16:creationId xmlns:a16="http://schemas.microsoft.com/office/drawing/2014/main" id="{FE57BCA3-AECB-46AC-738C-AF715CFD658F}"/>
+              </a:ext>
+            </a:extLst>
+          </p:cNvPr>
+          <p:cNvSpPr txBox="1"/>
+          <p:nvPr/>
+        </p:nvSpPr>
+        <p:spPr>
+          <a:xfrm>
+            <a:off x="377506" y="1619075"/>
+            <a:ext cx="9949342" cy="738664"/>
+          </a:xfrm>
+          <a:prstGeom prst="rect">
+            <a:avLst/>
+          </a:prstGeom>
+          <a:noFill/>
+        </p:spPr>
+        <p:txBody>
+          <a:bodyPr wrap="square" rtlCol="0">
+            <a:spAutoFit/>
+          </a:bodyPr>
+          <a:lstStyle/>
+          <a:p>
+            <a:r>
+              <a:rPr lang="fr-FR" dirty="0" err="1"/>
+              <a:t>Debug</a:t>
+            </a:r>
+            <a:r>
+              <a:rPr lang="fr-FR" dirty="0"/>
+              <a:t> des balises, maintenant fonctionnelles (Branche la masse, le retour)</a:t>
+            </a:r>
+          </a:p>
+          <a:p>
+            <a:endParaRPr lang="fr-FR" dirty="0"/>
+          </a:p>
+          <a:p>
+            <a:r>
+              <a:rPr lang="fr-FR" dirty="0"/>
+              <a:t>Nouvel gestion par le FPGA des données IMU, </a:t>
+            </a:r>
+            <a:r>
+              <a:rPr lang="fr-FR" dirty="0" err="1"/>
+              <a:t>Dataset</a:t>
+            </a:r>
+            <a:r>
+              <a:rPr lang="fr-FR" dirty="0"/>
+              <a:t> en cours d’analyses</a:t>
+            </a:r>
+          </a:p>
+        </p:txBody>
+      </p:sp>
     </p:spTree>
     <p:extLst>
       <p:ext uri="{BB962C8B-B14F-4D97-AF65-F5344CB8AC3E}">
@@ -8123,7 +8179,64 @@
           <a:bodyPr/>
           <a:lstStyle/>
           <a:p>
+            <a:pPr marL="186262" indent="0">
+              <a:buNone/>
+            </a:pPr>
+            <a:r>
+              <a:rPr lang="fr-FR" dirty="0"/>
+              <a:t>Algorithme de simulation avancé, base sur l’algo qui permet de passer d’un mode à l’autre présenté:</a:t>
+            </a:r>
+          </a:p>
+          <a:p>
+            <a:pPr marL="186262" indent="0">
+              <a:buNone/>
+            </a:pPr>
+            <a:r>
+              <a:rPr lang="fr-FR" dirty="0"/>
+              <a:t>	i = infraction</a:t>
+            </a:r>
+          </a:p>
+          <a:p>
+            <a:pPr marL="186262" indent="0">
+              <a:buNone/>
+            </a:pPr>
+            <a:r>
+              <a:rPr lang="fr-FR" dirty="0"/>
+              <a:t>	b = alerte de batterie</a:t>
+            </a:r>
+          </a:p>
+          <a:p>
+            <a:pPr marL="186262" indent="0">
+              <a:buNone/>
+            </a:pPr>
+            <a:r>
+              <a:rPr lang="fr-FR" dirty="0"/>
+              <a:t>	r = ronde demandée</a:t>
+            </a:r>
+          </a:p>
+          <a:p>
+            <a:pPr marL="186262" indent="0">
+              <a:buNone/>
+            </a:pPr>
+            <a:r>
+              <a:rPr lang="fr-FR" dirty="0"/>
+              <a:t>	m = changement de mode</a:t>
+            </a:r>
+          </a:p>
+          <a:p>
+            <a:pPr marL="186262" indent="0">
+              <a:buNone/>
+            </a:pPr>
             <a:endParaRPr lang="fr-FR" dirty="0"/>
+          </a:p>
+          <a:p>
+            <a:pPr marL="186262" indent="0">
+              <a:buNone/>
+            </a:pPr>
+            <a:r>
+              <a:rPr lang="fr-FR" dirty="0"/>
+              <a:t>	0, 1, 2, 3, 4 = Simulation de détection de tags RFID qui entraine rotation + avancée. </a:t>
+            </a:r>
           </a:p>
         </p:txBody>
       </p:sp>

</xml_diff>